<commit_message>
Update weights in ReadMe diagram
</commit_message>
<xml_diff>
--- a/architecture-diagram.pptx
+++ b/architecture-diagram.pptx
@@ -104,6 +104,11 @@
       </a:defRPr>
     </a:lvl9pPr>
   </p:defaultTextStyle>
+  <p:extLst>
+    <p:ext uri="{EFAFB233-063F-42B5-8137-9DF3F51BA10A}">
+      <p15:sldGuideLst xmlns:p15="http://schemas.microsoft.com/office/powerpoint/2012/main"/>
+    </p:ext>
+  </p:extLst>
 </p:presentation>
 </file>
 
@@ -254,7 +259,7 @@
           <a:p>
             <a:fld id="{D7FCA86F-962C-B44D-BC06-436EFD1F7217}" type="datetimeFigureOut">
               <a:rPr lang="en-US" smtClean="0"/>
-              <a:t>5/29/20</a:t>
+              <a:t>6/1/20</a:t>
             </a:fld>
             <a:endParaRPr lang="en-US"/>
           </a:p>
@@ -452,7 +457,7 @@
           <a:p>
             <a:fld id="{D7FCA86F-962C-B44D-BC06-436EFD1F7217}" type="datetimeFigureOut">
               <a:rPr lang="en-US" smtClean="0"/>
-              <a:t>5/29/20</a:t>
+              <a:t>6/1/20</a:t>
             </a:fld>
             <a:endParaRPr lang="en-US"/>
           </a:p>
@@ -660,7 +665,7 @@
           <a:p>
             <a:fld id="{D7FCA86F-962C-B44D-BC06-436EFD1F7217}" type="datetimeFigureOut">
               <a:rPr lang="en-US" smtClean="0"/>
-              <a:t>5/29/20</a:t>
+              <a:t>6/1/20</a:t>
             </a:fld>
             <a:endParaRPr lang="en-US"/>
           </a:p>
@@ -858,7 +863,7 @@
           <a:p>
             <a:fld id="{D7FCA86F-962C-B44D-BC06-436EFD1F7217}" type="datetimeFigureOut">
               <a:rPr lang="en-US" smtClean="0"/>
-              <a:t>5/29/20</a:t>
+              <a:t>6/1/20</a:t>
             </a:fld>
             <a:endParaRPr lang="en-US"/>
           </a:p>
@@ -1133,7 +1138,7 @@
           <a:p>
             <a:fld id="{D7FCA86F-962C-B44D-BC06-436EFD1F7217}" type="datetimeFigureOut">
               <a:rPr lang="en-US" smtClean="0"/>
-              <a:t>5/29/20</a:t>
+              <a:t>6/1/20</a:t>
             </a:fld>
             <a:endParaRPr lang="en-US"/>
           </a:p>
@@ -1398,7 +1403,7 @@
           <a:p>
             <a:fld id="{D7FCA86F-962C-B44D-BC06-436EFD1F7217}" type="datetimeFigureOut">
               <a:rPr lang="en-US" smtClean="0"/>
-              <a:t>5/29/20</a:t>
+              <a:t>6/1/20</a:t>
             </a:fld>
             <a:endParaRPr lang="en-US"/>
           </a:p>
@@ -1810,7 +1815,7 @@
           <a:p>
             <a:fld id="{D7FCA86F-962C-B44D-BC06-436EFD1F7217}" type="datetimeFigureOut">
               <a:rPr lang="en-US" smtClean="0"/>
-              <a:t>5/29/20</a:t>
+              <a:t>6/1/20</a:t>
             </a:fld>
             <a:endParaRPr lang="en-US"/>
           </a:p>
@@ -1951,7 +1956,7 @@
           <a:p>
             <a:fld id="{D7FCA86F-962C-B44D-BC06-436EFD1F7217}" type="datetimeFigureOut">
               <a:rPr lang="en-US" smtClean="0"/>
-              <a:t>5/29/20</a:t>
+              <a:t>6/1/20</a:t>
             </a:fld>
             <a:endParaRPr lang="en-US"/>
           </a:p>
@@ -2064,7 +2069,7 @@
           <a:p>
             <a:fld id="{D7FCA86F-962C-B44D-BC06-436EFD1F7217}" type="datetimeFigureOut">
               <a:rPr lang="en-US" smtClean="0"/>
-              <a:t>5/29/20</a:t>
+              <a:t>6/1/20</a:t>
             </a:fld>
             <a:endParaRPr lang="en-US"/>
           </a:p>
@@ -2375,7 +2380,7 @@
           <a:p>
             <a:fld id="{D7FCA86F-962C-B44D-BC06-436EFD1F7217}" type="datetimeFigureOut">
               <a:rPr lang="en-US" smtClean="0"/>
-              <a:t>5/29/20</a:t>
+              <a:t>6/1/20</a:t>
             </a:fld>
             <a:endParaRPr lang="en-US"/>
           </a:p>
@@ -2663,7 +2668,7 @@
           <a:p>
             <a:fld id="{D7FCA86F-962C-B44D-BC06-436EFD1F7217}" type="datetimeFigureOut">
               <a:rPr lang="en-US" smtClean="0"/>
-              <a:t>5/29/20</a:t>
+              <a:t>6/1/20</a:t>
             </a:fld>
             <a:endParaRPr lang="en-US"/>
           </a:p>
@@ -2904,7 +2909,7 @@
           <a:p>
             <a:fld id="{D7FCA86F-962C-B44D-BC06-436EFD1F7217}" type="datetimeFigureOut">
               <a:rPr lang="en-US" smtClean="0"/>
-              <a:t>5/29/20</a:t>
+              <a:t>6/1/20</a:t>
             </a:fld>
             <a:endParaRPr lang="en-US"/>
           </a:p>
@@ -3902,7 +3907,7 @@
                   <a:schemeClr val="tx1"/>
                 </a:solidFill>
               </a:rPr>
-              <a:t>v1=80%</a:t>
+              <a:t>v1=75%</a:t>
             </a:r>
           </a:p>
           <a:p>
@@ -3916,7 +3921,7 @@
                   <a:schemeClr val="tx1"/>
                 </a:solidFill>
               </a:rPr>
-              <a:t>v2=20%</a:t>
+              <a:t>v2=25%</a:t>
             </a:r>
           </a:p>
           <a:p>
@@ -4488,7 +4493,7 @@
           <a:p>
             <a:r>
               <a:rPr lang="en-US" dirty="0"/>
-              <a:t>204</a:t>
+              <a:t>192</a:t>
             </a:r>
           </a:p>
         </p:txBody>
@@ -4523,7 +4528,7 @@
           <a:p>
             <a:r>
               <a:rPr lang="en-US" dirty="0"/>
-              <a:t>51</a:t>
+              <a:t>64</a:t>
             </a:r>
           </a:p>
         </p:txBody>
@@ -4558,7 +4563,7 @@
           <a:p>
             <a:r>
               <a:rPr lang="en-US" dirty="0"/>
-              <a:t>63</a:t>
+              <a:t>64</a:t>
             </a:r>
           </a:p>
         </p:txBody>
@@ -4593,7 +4598,7 @@
           <a:p>
             <a:r>
               <a:rPr lang="en-US" dirty="0"/>
-              <a:t>63</a:t>
+              <a:t>64</a:t>
             </a:r>
           </a:p>
         </p:txBody>
@@ -4628,7 +4633,7 @@
           <a:p>
             <a:r>
               <a:rPr lang="en-US" dirty="0"/>
-              <a:t>127</a:t>
+              <a:t>128</a:t>
             </a:r>
           </a:p>
         </p:txBody>

</xml_diff>